<commit_message>
Update to Presentation pptx
</commit_message>
<xml_diff>
--- a/PureScript- JS.la presentation.pptx
+++ b/PureScript- JS.la presentation.pptx
@@ -13,16 +13,22 @@
     <p:sldId id="258" r:id="rId7"/>
     <p:sldId id="259" r:id="rId8"/>
     <p:sldId id="260" r:id="rId9"/>
+    <p:sldId id="261" r:id="rId10"/>
+    <p:sldId id="262" r:id="rId11"/>
+    <p:sldId id="263" r:id="rId12"/>
+    <p:sldId id="264" r:id="rId13"/>
+    <p:sldId id="265" r:id="rId14"/>
+    <p:sldId id="266" r:id="rId15"/>
   </p:sldIdLst>
   <p:sldSz cy="5143500" cx="9144000"/>
   <p:notesSz cx="6858000" cy="9144000"/>
   <p:embeddedFontLst>
     <p:embeddedFont>
       <p:font typeface="Proxima Nova"/>
-      <p:regular r:id="rId10"/>
-      <p:bold r:id="rId11"/>
-      <p:italic r:id="rId12"/>
-      <p:boldItalic r:id="rId13"/>
+      <p:regular r:id="rId16"/>
+      <p:bold r:id="rId17"/>
+      <p:italic r:id="rId18"/>
+      <p:boldItalic r:id="rId19"/>
     </p:embeddedFont>
   </p:embeddedFontLst>
   <p:defaultTextStyle>
@@ -474,6 +480,196 @@
 </p:notes>
 </file>
 
+<file path=ppt/notesSlides/notesSlide10.xml><?xml version="1.0" encoding="utf-8"?>
+<p:notes xmlns:a="http://schemas.openxmlformats.org/drawingml/2006/main" xmlns:r="http://schemas.openxmlformats.org/officeDocument/2006/relationships" xmlns:mc="http://schemas.openxmlformats.org/markup-compatibility/2006" xmlns:mv="urn:schemas-microsoft-com:mac:vml" xmlns:p="http://schemas.openxmlformats.org/presentationml/2006/main" xmlns:c="http://schemas.openxmlformats.org/drawingml/2006/chart" xmlns:dgm="http://schemas.openxmlformats.org/drawingml/2006/diagram" xmlns:o="urn:schemas-microsoft-com:office:office" xmlns:v="urn:schemas-microsoft-com:vml" xmlns:pvml="urn:schemas-microsoft-com:office:powerpoint" xmlns:com="http://schemas.openxmlformats.org/drawingml/2006/compatibility" xmlns:p14="http://schemas.microsoft.com/office/powerpoint/2010/main" showMasterPhAnim="0" showMasterSp="0">
+  <p:cSld>
+    <p:spTree>
+      <p:nvGrpSpPr>
+        <p:cNvPr id="117" name="Shape 117"/>
+        <p:cNvGrpSpPr/>
+        <p:nvPr/>
+      </p:nvGrpSpPr>
+      <p:grpSpPr>
+        <a:xfrm>
+          <a:off x="0" y="0"/>
+          <a:ext cx="0" cy="0"/>
+          <a:chOff x="0" y="0"/>
+          <a:chExt cx="0" cy="0"/>
+        </a:xfrm>
+      </p:grpSpPr>
+      <p:sp>
+        <p:nvSpPr>
+          <p:cNvPr id="118" name="Shape 118"/>
+          <p:cNvSpPr/>
+          <p:nvPr>
+            <p:ph idx="2" type="sldImg"/>
+          </p:nvPr>
+        </p:nvSpPr>
+        <p:spPr>
+          <a:xfrm>
+            <a:off x="381300" y="685800"/>
+            <a:ext cx="6096000" cy="3429000"/>
+          </a:xfrm>
+          <a:custGeom>
+            <a:pathLst>
+              <a:path extrusionOk="0" h="120000" w="120000">
+                <a:moveTo>
+                  <a:pt x="0" y="0"/>
+                </a:moveTo>
+                <a:lnTo>
+                  <a:pt x="120000" y="0"/>
+                </a:lnTo>
+                <a:lnTo>
+                  <a:pt x="120000" y="120000"/>
+                </a:lnTo>
+                <a:lnTo>
+                  <a:pt x="0" y="120000"/>
+                </a:lnTo>
+                <a:close/>
+              </a:path>
+            </a:pathLst>
+          </a:custGeom>
+        </p:spPr>
+      </p:sp>
+      <p:sp>
+        <p:nvSpPr>
+          <p:cNvPr id="119" name="Shape 119"/>
+          <p:cNvSpPr txBox="1"/>
+          <p:nvPr>
+            <p:ph idx="1" type="body"/>
+          </p:nvPr>
+        </p:nvSpPr>
+        <p:spPr>
+          <a:xfrm>
+            <a:off x="685800" y="4343400"/>
+            <a:ext cx="5486400" cy="4114800"/>
+          </a:xfrm>
+          <a:prstGeom prst="rect">
+            <a:avLst/>
+          </a:prstGeom>
+        </p:spPr>
+        <p:txBody>
+          <a:bodyPr anchorCtr="0" anchor="t" bIns="91425" lIns="91425" rIns="91425" tIns="91425">
+            <a:noAutofit/>
+          </a:bodyPr>
+          <a:lstStyle/>
+          <a:p>
+            <a:pPr lvl="0">
+              <a:spcBef>
+                <a:spcPts val="0"/>
+              </a:spcBef>
+              <a:buNone/>
+            </a:pPr>
+            <a:r>
+              <a:t/>
+            </a:r>
+            <a:endParaRPr/>
+          </a:p>
+        </p:txBody>
+      </p:sp>
+    </p:spTree>
+  </p:cSld>
+  <p:clrMapOvr>
+    <a:masterClrMapping/>
+  </p:clrMapOvr>
+</p:notes>
+</file>
+
+<file path=ppt/notesSlides/notesSlide11.xml><?xml version="1.0" encoding="utf-8"?>
+<p:notes xmlns:a="http://schemas.openxmlformats.org/drawingml/2006/main" xmlns:r="http://schemas.openxmlformats.org/officeDocument/2006/relationships" xmlns:mc="http://schemas.openxmlformats.org/markup-compatibility/2006" xmlns:mv="urn:schemas-microsoft-com:mac:vml" xmlns:p="http://schemas.openxmlformats.org/presentationml/2006/main" xmlns:c="http://schemas.openxmlformats.org/drawingml/2006/chart" xmlns:dgm="http://schemas.openxmlformats.org/drawingml/2006/diagram" xmlns:o="urn:schemas-microsoft-com:office:office" xmlns:v="urn:schemas-microsoft-com:vml" xmlns:pvml="urn:schemas-microsoft-com:office:powerpoint" xmlns:com="http://schemas.openxmlformats.org/drawingml/2006/compatibility" xmlns:p14="http://schemas.microsoft.com/office/powerpoint/2010/main" showMasterPhAnim="0" showMasterSp="0">
+  <p:cSld>
+    <p:spTree>
+      <p:nvGrpSpPr>
+        <p:cNvPr id="123" name="Shape 123"/>
+        <p:cNvGrpSpPr/>
+        <p:nvPr/>
+      </p:nvGrpSpPr>
+      <p:grpSpPr>
+        <a:xfrm>
+          <a:off x="0" y="0"/>
+          <a:ext cx="0" cy="0"/>
+          <a:chOff x="0" y="0"/>
+          <a:chExt cx="0" cy="0"/>
+        </a:xfrm>
+      </p:grpSpPr>
+      <p:sp>
+        <p:nvSpPr>
+          <p:cNvPr id="124" name="Shape 124"/>
+          <p:cNvSpPr/>
+          <p:nvPr>
+            <p:ph idx="2" type="sldImg"/>
+          </p:nvPr>
+        </p:nvSpPr>
+        <p:spPr>
+          <a:xfrm>
+            <a:off x="381300" y="685800"/>
+            <a:ext cx="6096000" cy="3429000"/>
+          </a:xfrm>
+          <a:custGeom>
+            <a:pathLst>
+              <a:path extrusionOk="0" h="120000" w="120000">
+                <a:moveTo>
+                  <a:pt x="0" y="0"/>
+                </a:moveTo>
+                <a:lnTo>
+                  <a:pt x="120000" y="0"/>
+                </a:lnTo>
+                <a:lnTo>
+                  <a:pt x="120000" y="120000"/>
+                </a:lnTo>
+                <a:lnTo>
+                  <a:pt x="0" y="120000"/>
+                </a:lnTo>
+                <a:close/>
+              </a:path>
+            </a:pathLst>
+          </a:custGeom>
+        </p:spPr>
+      </p:sp>
+      <p:sp>
+        <p:nvSpPr>
+          <p:cNvPr id="125" name="Shape 125"/>
+          <p:cNvSpPr txBox="1"/>
+          <p:nvPr>
+            <p:ph idx="1" type="body"/>
+          </p:nvPr>
+        </p:nvSpPr>
+        <p:spPr>
+          <a:xfrm>
+            <a:off x="685800" y="4343400"/>
+            <a:ext cx="5486400" cy="4114800"/>
+          </a:xfrm>
+          <a:prstGeom prst="rect">
+            <a:avLst/>
+          </a:prstGeom>
+        </p:spPr>
+        <p:txBody>
+          <a:bodyPr anchorCtr="0" anchor="t" bIns="91425" lIns="91425" rIns="91425" tIns="91425">
+            <a:noAutofit/>
+          </a:bodyPr>
+          <a:lstStyle/>
+          <a:p>
+            <a:pPr lvl="0">
+              <a:spcBef>
+                <a:spcPts val="0"/>
+              </a:spcBef>
+              <a:buNone/>
+            </a:pPr>
+            <a:r>
+              <a:t/>
+            </a:r>
+            <a:endParaRPr/>
+          </a:p>
+        </p:txBody>
+      </p:sp>
+    </p:spTree>
+  </p:cSld>
+  <p:clrMapOvr>
+    <a:masterClrMapping/>
+  </p:clrMapOvr>
+</p:notes>
+</file>
+
 <file path=ppt/notesSlides/notesSlide2.xml><?xml version="1.0" encoding="utf-8"?>
 <p:notes xmlns:a="http://schemas.openxmlformats.org/drawingml/2006/main" xmlns:r="http://schemas.openxmlformats.org/officeDocument/2006/relationships" xmlns:mc="http://schemas.openxmlformats.org/markup-compatibility/2006" xmlns:mv="urn:schemas-microsoft-com:mac:vml" xmlns:p="http://schemas.openxmlformats.org/presentationml/2006/main" xmlns:c="http://schemas.openxmlformats.org/drawingml/2006/chart" xmlns:dgm="http://schemas.openxmlformats.org/drawingml/2006/diagram" xmlns:o="urn:schemas-microsoft-com:office:office" xmlns:v="urn:schemas-microsoft-com:vml" xmlns:pvml="urn:schemas-microsoft-com:office:powerpoint" xmlns:com="http://schemas.openxmlformats.org/drawingml/2006/compatibility" xmlns:p14="http://schemas.microsoft.com/office/powerpoint/2010/main" showMasterPhAnim="0" showMasterSp="0">
   <p:cSld>
@@ -813,6 +1009,386 @@
       <p:sp>
         <p:nvSpPr>
           <p:cNvPr id="89" name="Shape 89"/>
+          <p:cNvSpPr txBox="1"/>
+          <p:nvPr>
+            <p:ph idx="1" type="body"/>
+          </p:nvPr>
+        </p:nvSpPr>
+        <p:spPr>
+          <a:xfrm>
+            <a:off x="685800" y="4343400"/>
+            <a:ext cx="5486400" cy="4114800"/>
+          </a:xfrm>
+          <a:prstGeom prst="rect">
+            <a:avLst/>
+          </a:prstGeom>
+        </p:spPr>
+        <p:txBody>
+          <a:bodyPr anchorCtr="0" anchor="t" bIns="91425" lIns="91425" rIns="91425" tIns="91425">
+            <a:noAutofit/>
+          </a:bodyPr>
+          <a:lstStyle/>
+          <a:p>
+            <a:pPr lvl="0">
+              <a:spcBef>
+                <a:spcPts val="0"/>
+              </a:spcBef>
+              <a:buNone/>
+            </a:pPr>
+            <a:r>
+              <a:t/>
+            </a:r>
+            <a:endParaRPr/>
+          </a:p>
+        </p:txBody>
+      </p:sp>
+    </p:spTree>
+  </p:cSld>
+  <p:clrMapOvr>
+    <a:masterClrMapping/>
+  </p:clrMapOvr>
+</p:notes>
+</file>
+
+<file path=ppt/notesSlides/notesSlide6.xml><?xml version="1.0" encoding="utf-8"?>
+<p:notes xmlns:a="http://schemas.openxmlformats.org/drawingml/2006/main" xmlns:r="http://schemas.openxmlformats.org/officeDocument/2006/relationships" xmlns:mc="http://schemas.openxmlformats.org/markup-compatibility/2006" xmlns:mv="urn:schemas-microsoft-com:mac:vml" xmlns:p="http://schemas.openxmlformats.org/presentationml/2006/main" xmlns:c="http://schemas.openxmlformats.org/drawingml/2006/chart" xmlns:dgm="http://schemas.openxmlformats.org/drawingml/2006/diagram" xmlns:o="urn:schemas-microsoft-com:office:office" xmlns:v="urn:schemas-microsoft-com:vml" xmlns:pvml="urn:schemas-microsoft-com:office:powerpoint" xmlns:com="http://schemas.openxmlformats.org/drawingml/2006/compatibility" xmlns:p14="http://schemas.microsoft.com/office/powerpoint/2010/main" showMasterPhAnim="0" showMasterSp="0">
+  <p:cSld>
+    <p:spTree>
+      <p:nvGrpSpPr>
+        <p:cNvPr id="93" name="Shape 93"/>
+        <p:cNvGrpSpPr/>
+        <p:nvPr/>
+      </p:nvGrpSpPr>
+      <p:grpSpPr>
+        <a:xfrm>
+          <a:off x="0" y="0"/>
+          <a:ext cx="0" cy="0"/>
+          <a:chOff x="0" y="0"/>
+          <a:chExt cx="0" cy="0"/>
+        </a:xfrm>
+      </p:grpSpPr>
+      <p:sp>
+        <p:nvSpPr>
+          <p:cNvPr id="94" name="Shape 94"/>
+          <p:cNvSpPr/>
+          <p:nvPr>
+            <p:ph idx="2" type="sldImg"/>
+          </p:nvPr>
+        </p:nvSpPr>
+        <p:spPr>
+          <a:xfrm>
+            <a:off x="381300" y="685800"/>
+            <a:ext cx="6096000" cy="3429000"/>
+          </a:xfrm>
+          <a:custGeom>
+            <a:pathLst>
+              <a:path extrusionOk="0" h="120000" w="120000">
+                <a:moveTo>
+                  <a:pt x="0" y="0"/>
+                </a:moveTo>
+                <a:lnTo>
+                  <a:pt x="120000" y="0"/>
+                </a:lnTo>
+                <a:lnTo>
+                  <a:pt x="120000" y="120000"/>
+                </a:lnTo>
+                <a:lnTo>
+                  <a:pt x="0" y="120000"/>
+                </a:lnTo>
+                <a:close/>
+              </a:path>
+            </a:pathLst>
+          </a:custGeom>
+        </p:spPr>
+      </p:sp>
+      <p:sp>
+        <p:nvSpPr>
+          <p:cNvPr id="95" name="Shape 95"/>
+          <p:cNvSpPr txBox="1"/>
+          <p:nvPr>
+            <p:ph idx="1" type="body"/>
+          </p:nvPr>
+        </p:nvSpPr>
+        <p:spPr>
+          <a:xfrm>
+            <a:off x="685800" y="4343400"/>
+            <a:ext cx="5486400" cy="4114800"/>
+          </a:xfrm>
+          <a:prstGeom prst="rect">
+            <a:avLst/>
+          </a:prstGeom>
+        </p:spPr>
+        <p:txBody>
+          <a:bodyPr anchorCtr="0" anchor="t" bIns="91425" lIns="91425" rIns="91425" tIns="91425">
+            <a:noAutofit/>
+          </a:bodyPr>
+          <a:lstStyle/>
+          <a:p>
+            <a:pPr lvl="0">
+              <a:spcBef>
+                <a:spcPts val="0"/>
+              </a:spcBef>
+              <a:buNone/>
+            </a:pPr>
+            <a:r>
+              <a:t/>
+            </a:r>
+            <a:endParaRPr/>
+          </a:p>
+        </p:txBody>
+      </p:sp>
+    </p:spTree>
+  </p:cSld>
+  <p:clrMapOvr>
+    <a:masterClrMapping/>
+  </p:clrMapOvr>
+</p:notes>
+</file>
+
+<file path=ppt/notesSlides/notesSlide7.xml><?xml version="1.0" encoding="utf-8"?>
+<p:notes xmlns:a="http://schemas.openxmlformats.org/drawingml/2006/main" xmlns:r="http://schemas.openxmlformats.org/officeDocument/2006/relationships" xmlns:mc="http://schemas.openxmlformats.org/markup-compatibility/2006" xmlns:mv="urn:schemas-microsoft-com:mac:vml" xmlns:p="http://schemas.openxmlformats.org/presentationml/2006/main" xmlns:c="http://schemas.openxmlformats.org/drawingml/2006/chart" xmlns:dgm="http://schemas.openxmlformats.org/drawingml/2006/diagram" xmlns:o="urn:schemas-microsoft-com:office:office" xmlns:v="urn:schemas-microsoft-com:vml" xmlns:pvml="urn:schemas-microsoft-com:office:powerpoint" xmlns:com="http://schemas.openxmlformats.org/drawingml/2006/compatibility" xmlns:p14="http://schemas.microsoft.com/office/powerpoint/2010/main" showMasterPhAnim="0" showMasterSp="0">
+  <p:cSld>
+    <p:spTree>
+      <p:nvGrpSpPr>
+        <p:cNvPr id="99" name="Shape 99"/>
+        <p:cNvGrpSpPr/>
+        <p:nvPr/>
+      </p:nvGrpSpPr>
+      <p:grpSpPr>
+        <a:xfrm>
+          <a:off x="0" y="0"/>
+          <a:ext cx="0" cy="0"/>
+          <a:chOff x="0" y="0"/>
+          <a:chExt cx="0" cy="0"/>
+        </a:xfrm>
+      </p:grpSpPr>
+      <p:sp>
+        <p:nvSpPr>
+          <p:cNvPr id="100" name="Shape 100"/>
+          <p:cNvSpPr/>
+          <p:nvPr>
+            <p:ph idx="2" type="sldImg"/>
+          </p:nvPr>
+        </p:nvSpPr>
+        <p:spPr>
+          <a:xfrm>
+            <a:off x="381300" y="685800"/>
+            <a:ext cx="6096000" cy="3429000"/>
+          </a:xfrm>
+          <a:custGeom>
+            <a:pathLst>
+              <a:path extrusionOk="0" h="120000" w="120000">
+                <a:moveTo>
+                  <a:pt x="0" y="0"/>
+                </a:moveTo>
+                <a:lnTo>
+                  <a:pt x="120000" y="0"/>
+                </a:lnTo>
+                <a:lnTo>
+                  <a:pt x="120000" y="120000"/>
+                </a:lnTo>
+                <a:lnTo>
+                  <a:pt x="0" y="120000"/>
+                </a:lnTo>
+                <a:close/>
+              </a:path>
+            </a:pathLst>
+          </a:custGeom>
+        </p:spPr>
+      </p:sp>
+      <p:sp>
+        <p:nvSpPr>
+          <p:cNvPr id="101" name="Shape 101"/>
+          <p:cNvSpPr txBox="1"/>
+          <p:nvPr>
+            <p:ph idx="1" type="body"/>
+          </p:nvPr>
+        </p:nvSpPr>
+        <p:spPr>
+          <a:xfrm>
+            <a:off x="685800" y="4343400"/>
+            <a:ext cx="5486400" cy="4114800"/>
+          </a:xfrm>
+          <a:prstGeom prst="rect">
+            <a:avLst/>
+          </a:prstGeom>
+        </p:spPr>
+        <p:txBody>
+          <a:bodyPr anchorCtr="0" anchor="t" bIns="91425" lIns="91425" rIns="91425" tIns="91425">
+            <a:noAutofit/>
+          </a:bodyPr>
+          <a:lstStyle/>
+          <a:p>
+            <a:pPr lvl="0">
+              <a:spcBef>
+                <a:spcPts val="0"/>
+              </a:spcBef>
+              <a:buNone/>
+            </a:pPr>
+            <a:r>
+              <a:t/>
+            </a:r>
+            <a:endParaRPr/>
+          </a:p>
+        </p:txBody>
+      </p:sp>
+    </p:spTree>
+  </p:cSld>
+  <p:clrMapOvr>
+    <a:masterClrMapping/>
+  </p:clrMapOvr>
+</p:notes>
+</file>
+
+<file path=ppt/notesSlides/notesSlide8.xml><?xml version="1.0" encoding="utf-8"?>
+<p:notes xmlns:a="http://schemas.openxmlformats.org/drawingml/2006/main" xmlns:r="http://schemas.openxmlformats.org/officeDocument/2006/relationships" xmlns:mc="http://schemas.openxmlformats.org/markup-compatibility/2006" xmlns:mv="urn:schemas-microsoft-com:mac:vml" xmlns:p="http://schemas.openxmlformats.org/presentationml/2006/main" xmlns:c="http://schemas.openxmlformats.org/drawingml/2006/chart" xmlns:dgm="http://schemas.openxmlformats.org/drawingml/2006/diagram" xmlns:o="urn:schemas-microsoft-com:office:office" xmlns:v="urn:schemas-microsoft-com:vml" xmlns:pvml="urn:schemas-microsoft-com:office:powerpoint" xmlns:com="http://schemas.openxmlformats.org/drawingml/2006/compatibility" xmlns:p14="http://schemas.microsoft.com/office/powerpoint/2010/main" showMasterPhAnim="0" showMasterSp="0">
+  <p:cSld>
+    <p:spTree>
+      <p:nvGrpSpPr>
+        <p:cNvPr id="105" name="Shape 105"/>
+        <p:cNvGrpSpPr/>
+        <p:nvPr/>
+      </p:nvGrpSpPr>
+      <p:grpSpPr>
+        <a:xfrm>
+          <a:off x="0" y="0"/>
+          <a:ext cx="0" cy="0"/>
+          <a:chOff x="0" y="0"/>
+          <a:chExt cx="0" cy="0"/>
+        </a:xfrm>
+      </p:grpSpPr>
+      <p:sp>
+        <p:nvSpPr>
+          <p:cNvPr id="106" name="Shape 106"/>
+          <p:cNvSpPr/>
+          <p:nvPr>
+            <p:ph idx="2" type="sldImg"/>
+          </p:nvPr>
+        </p:nvSpPr>
+        <p:spPr>
+          <a:xfrm>
+            <a:off x="381300" y="685800"/>
+            <a:ext cx="6096000" cy="3429000"/>
+          </a:xfrm>
+          <a:custGeom>
+            <a:pathLst>
+              <a:path extrusionOk="0" h="120000" w="120000">
+                <a:moveTo>
+                  <a:pt x="0" y="0"/>
+                </a:moveTo>
+                <a:lnTo>
+                  <a:pt x="120000" y="0"/>
+                </a:lnTo>
+                <a:lnTo>
+                  <a:pt x="120000" y="120000"/>
+                </a:lnTo>
+                <a:lnTo>
+                  <a:pt x="0" y="120000"/>
+                </a:lnTo>
+                <a:close/>
+              </a:path>
+            </a:pathLst>
+          </a:custGeom>
+        </p:spPr>
+      </p:sp>
+      <p:sp>
+        <p:nvSpPr>
+          <p:cNvPr id="107" name="Shape 107"/>
+          <p:cNvSpPr txBox="1"/>
+          <p:nvPr>
+            <p:ph idx="1" type="body"/>
+          </p:nvPr>
+        </p:nvSpPr>
+        <p:spPr>
+          <a:xfrm>
+            <a:off x="685800" y="4343400"/>
+            <a:ext cx="5486400" cy="4114800"/>
+          </a:xfrm>
+          <a:prstGeom prst="rect">
+            <a:avLst/>
+          </a:prstGeom>
+        </p:spPr>
+        <p:txBody>
+          <a:bodyPr anchorCtr="0" anchor="t" bIns="91425" lIns="91425" rIns="91425" tIns="91425">
+            <a:noAutofit/>
+          </a:bodyPr>
+          <a:lstStyle/>
+          <a:p>
+            <a:pPr lvl="0">
+              <a:spcBef>
+                <a:spcPts val="0"/>
+              </a:spcBef>
+              <a:buNone/>
+            </a:pPr>
+            <a:r>
+              <a:t/>
+            </a:r>
+            <a:endParaRPr/>
+          </a:p>
+        </p:txBody>
+      </p:sp>
+    </p:spTree>
+  </p:cSld>
+  <p:clrMapOvr>
+    <a:masterClrMapping/>
+  </p:clrMapOvr>
+</p:notes>
+</file>
+
+<file path=ppt/notesSlides/notesSlide9.xml><?xml version="1.0" encoding="utf-8"?>
+<p:notes xmlns:a="http://schemas.openxmlformats.org/drawingml/2006/main" xmlns:r="http://schemas.openxmlformats.org/officeDocument/2006/relationships" xmlns:mc="http://schemas.openxmlformats.org/markup-compatibility/2006" xmlns:mv="urn:schemas-microsoft-com:mac:vml" xmlns:p="http://schemas.openxmlformats.org/presentationml/2006/main" xmlns:c="http://schemas.openxmlformats.org/drawingml/2006/chart" xmlns:dgm="http://schemas.openxmlformats.org/drawingml/2006/diagram" xmlns:o="urn:schemas-microsoft-com:office:office" xmlns:v="urn:schemas-microsoft-com:vml" xmlns:pvml="urn:schemas-microsoft-com:office:powerpoint" xmlns:com="http://schemas.openxmlformats.org/drawingml/2006/compatibility" xmlns:p14="http://schemas.microsoft.com/office/powerpoint/2010/main" showMasterPhAnim="0" showMasterSp="0">
+  <p:cSld>
+    <p:spTree>
+      <p:nvGrpSpPr>
+        <p:cNvPr id="111" name="Shape 111"/>
+        <p:cNvGrpSpPr/>
+        <p:nvPr/>
+      </p:nvGrpSpPr>
+      <p:grpSpPr>
+        <a:xfrm>
+          <a:off x="0" y="0"/>
+          <a:ext cx="0" cy="0"/>
+          <a:chOff x="0" y="0"/>
+          <a:chExt cx="0" cy="0"/>
+        </a:xfrm>
+      </p:grpSpPr>
+      <p:sp>
+        <p:nvSpPr>
+          <p:cNvPr id="112" name="Shape 112"/>
+          <p:cNvSpPr/>
+          <p:nvPr>
+            <p:ph idx="2" type="sldImg"/>
+          </p:nvPr>
+        </p:nvSpPr>
+        <p:spPr>
+          <a:xfrm>
+            <a:off x="381300" y="685800"/>
+            <a:ext cx="6096000" cy="3429000"/>
+          </a:xfrm>
+          <a:custGeom>
+            <a:pathLst>
+              <a:path extrusionOk="0" h="120000" w="120000">
+                <a:moveTo>
+                  <a:pt x="0" y="0"/>
+                </a:moveTo>
+                <a:lnTo>
+                  <a:pt x="120000" y="0"/>
+                </a:lnTo>
+                <a:lnTo>
+                  <a:pt x="120000" y="120000"/>
+                </a:lnTo>
+                <a:lnTo>
+                  <a:pt x="0" y="120000"/>
+                </a:lnTo>
+                <a:close/>
+              </a:path>
+            </a:pathLst>
+          </a:custGeom>
+        </p:spPr>
+      </p:sp>
+      <p:sp>
+        <p:nvSpPr>
+          <p:cNvPr id="113" name="Shape 113"/>
           <p:cNvSpPr txBox="1"/>
           <p:nvPr>
             <p:ph idx="1" type="body"/>
@@ -4795,6 +5371,200 @@
 </p:sld>
 </file>
 
+<file path=ppt/slides/slide10.xml><?xml version="1.0" encoding="utf-8"?>
+<p:sld xmlns:a="http://schemas.openxmlformats.org/drawingml/2006/main" xmlns:r="http://schemas.openxmlformats.org/officeDocument/2006/relationships" xmlns:mc="http://schemas.openxmlformats.org/markup-compatibility/2006" xmlns:mv="urn:schemas-microsoft-com:mac:vml" xmlns:p="http://schemas.openxmlformats.org/presentationml/2006/main" xmlns:c="http://schemas.openxmlformats.org/drawingml/2006/chart" xmlns:dgm="http://schemas.openxmlformats.org/drawingml/2006/diagram" xmlns:o="urn:schemas-microsoft-com:office:office" xmlns:v="urn:schemas-microsoft-com:vml" xmlns:pvml="urn:schemas-microsoft-com:office:powerpoint" xmlns:com="http://schemas.openxmlformats.org/drawingml/2006/compatibility" xmlns:p14="http://schemas.microsoft.com/office/powerpoint/2010/main">
+  <p:cSld>
+    <p:spTree>
+      <p:nvGrpSpPr>
+        <p:cNvPr id="120" name="Shape 120"/>
+        <p:cNvGrpSpPr/>
+        <p:nvPr/>
+      </p:nvGrpSpPr>
+      <p:grpSpPr>
+        <a:xfrm>
+          <a:off x="0" y="0"/>
+          <a:ext cx="0" cy="0"/>
+          <a:chOff x="0" y="0"/>
+          <a:chExt cx="0" cy="0"/>
+        </a:xfrm>
+      </p:grpSpPr>
+      <p:sp>
+        <p:nvSpPr>
+          <p:cNvPr id="121" name="Shape 121"/>
+          <p:cNvSpPr txBox="1"/>
+          <p:nvPr>
+            <p:ph type="title"/>
+          </p:nvPr>
+        </p:nvSpPr>
+        <p:spPr>
+          <a:xfrm>
+            <a:off x="311700" y="445025"/>
+            <a:ext cx="8520600" cy="572700"/>
+          </a:xfrm>
+          <a:prstGeom prst="rect">
+            <a:avLst/>
+          </a:prstGeom>
+        </p:spPr>
+        <p:txBody>
+          <a:bodyPr anchorCtr="0" anchor="t" bIns="91425" lIns="91425" rIns="91425" tIns="91425">
+            <a:noAutofit/>
+          </a:bodyPr>
+          <a:lstStyle/>
+          <a:p>
+            <a:pPr lvl="0">
+              <a:spcBef>
+                <a:spcPts val="0"/>
+              </a:spcBef>
+              <a:buNone/>
+            </a:pPr>
+            <a:r>
+              <a:rPr lang="en"/>
+              <a:t>Monads</a:t>
+            </a:r>
+          </a:p>
+        </p:txBody>
+      </p:sp>
+      <p:sp>
+        <p:nvSpPr>
+          <p:cNvPr id="122" name="Shape 122"/>
+          <p:cNvSpPr txBox="1"/>
+          <p:nvPr>
+            <p:ph idx="1" type="body"/>
+          </p:nvPr>
+        </p:nvSpPr>
+        <p:spPr>
+          <a:xfrm>
+            <a:off x="311700" y="1152475"/>
+            <a:ext cx="8520600" cy="3416400"/>
+          </a:xfrm>
+          <a:prstGeom prst="rect">
+            <a:avLst/>
+          </a:prstGeom>
+        </p:spPr>
+        <p:txBody>
+          <a:bodyPr anchorCtr="0" anchor="t" bIns="91425" lIns="91425" rIns="91425" tIns="91425">
+            <a:noAutofit/>
+          </a:bodyPr>
+          <a:lstStyle/>
+          <a:p>
+            <a:pPr lvl="0">
+              <a:spcBef>
+                <a:spcPts val="0"/>
+              </a:spcBef>
+              <a:buNone/>
+            </a:pPr>
+            <a:r>
+              <a:t/>
+            </a:r>
+            <a:endParaRPr/>
+          </a:p>
+        </p:txBody>
+      </p:sp>
+    </p:spTree>
+  </p:cSld>
+  <p:clrMapOvr>
+    <a:masterClrMapping/>
+  </p:clrMapOvr>
+</p:sld>
+</file>
+
+<file path=ppt/slides/slide11.xml><?xml version="1.0" encoding="utf-8"?>
+<p:sld xmlns:a="http://schemas.openxmlformats.org/drawingml/2006/main" xmlns:r="http://schemas.openxmlformats.org/officeDocument/2006/relationships" xmlns:mc="http://schemas.openxmlformats.org/markup-compatibility/2006" xmlns:mv="urn:schemas-microsoft-com:mac:vml" xmlns:p="http://schemas.openxmlformats.org/presentationml/2006/main" xmlns:c="http://schemas.openxmlformats.org/drawingml/2006/chart" xmlns:dgm="http://schemas.openxmlformats.org/drawingml/2006/diagram" xmlns:o="urn:schemas-microsoft-com:office:office" xmlns:v="urn:schemas-microsoft-com:vml" xmlns:pvml="urn:schemas-microsoft-com:office:powerpoint" xmlns:com="http://schemas.openxmlformats.org/drawingml/2006/compatibility" xmlns:p14="http://schemas.microsoft.com/office/powerpoint/2010/main">
+  <p:cSld>
+    <p:spTree>
+      <p:nvGrpSpPr>
+        <p:cNvPr id="126" name="Shape 126"/>
+        <p:cNvGrpSpPr/>
+        <p:nvPr/>
+      </p:nvGrpSpPr>
+      <p:grpSpPr>
+        <a:xfrm>
+          <a:off x="0" y="0"/>
+          <a:ext cx="0" cy="0"/>
+          <a:chOff x="0" y="0"/>
+          <a:chExt cx="0" cy="0"/>
+        </a:xfrm>
+      </p:grpSpPr>
+      <p:sp>
+        <p:nvSpPr>
+          <p:cNvPr id="127" name="Shape 127"/>
+          <p:cNvSpPr txBox="1"/>
+          <p:nvPr>
+            <p:ph type="title"/>
+          </p:nvPr>
+        </p:nvSpPr>
+        <p:spPr>
+          <a:xfrm>
+            <a:off x="311700" y="445025"/>
+            <a:ext cx="8520600" cy="572700"/>
+          </a:xfrm>
+          <a:prstGeom prst="rect">
+            <a:avLst/>
+          </a:prstGeom>
+        </p:spPr>
+        <p:txBody>
+          <a:bodyPr anchorCtr="0" anchor="t" bIns="91425" lIns="91425" rIns="91425" tIns="91425">
+            <a:noAutofit/>
+          </a:bodyPr>
+          <a:lstStyle/>
+          <a:p>
+            <a:pPr lvl="0">
+              <a:spcBef>
+                <a:spcPts val="0"/>
+              </a:spcBef>
+              <a:buNone/>
+            </a:pPr>
+            <a:r>
+              <a:t/>
+            </a:r>
+            <a:endParaRPr/>
+          </a:p>
+        </p:txBody>
+      </p:sp>
+      <p:sp>
+        <p:nvSpPr>
+          <p:cNvPr id="128" name="Shape 128"/>
+          <p:cNvSpPr txBox="1"/>
+          <p:nvPr>
+            <p:ph idx="1" type="body"/>
+          </p:nvPr>
+        </p:nvSpPr>
+        <p:spPr>
+          <a:xfrm>
+            <a:off x="311700" y="1152475"/>
+            <a:ext cx="8520600" cy="3416400"/>
+          </a:xfrm>
+          <a:prstGeom prst="rect">
+            <a:avLst/>
+          </a:prstGeom>
+        </p:spPr>
+        <p:txBody>
+          <a:bodyPr anchorCtr="0" anchor="t" bIns="91425" lIns="91425" rIns="91425" tIns="91425">
+            <a:noAutofit/>
+          </a:bodyPr>
+          <a:lstStyle/>
+          <a:p>
+            <a:pPr lvl="0">
+              <a:spcBef>
+                <a:spcPts val="0"/>
+              </a:spcBef>
+              <a:buNone/>
+            </a:pPr>
+            <a:r>
+              <a:t/>
+            </a:r>
+            <a:endParaRPr/>
+          </a:p>
+        </p:txBody>
+      </p:sp>
+    </p:spTree>
+  </p:cSld>
+  <p:clrMapOvr>
+    <a:masterClrMapping/>
+  </p:clrMapOvr>
+</p:sld>
+</file>
+
 <file path=ppt/slides/slide2.xml><?xml version="1.0" encoding="utf-8"?>
 <p:sld xmlns:a="http://schemas.openxmlformats.org/drawingml/2006/main" xmlns:r="http://schemas.openxmlformats.org/officeDocument/2006/relationships" xmlns:mc="http://schemas.openxmlformats.org/markup-compatibility/2006" xmlns:mv="urn:schemas-microsoft-com:mac:vml" xmlns:p="http://schemas.openxmlformats.org/presentationml/2006/main" xmlns:c="http://schemas.openxmlformats.org/drawingml/2006/chart" xmlns:dgm="http://schemas.openxmlformats.org/drawingml/2006/diagram" xmlns:o="urn:schemas-microsoft-com:office:office" xmlns:v="urn:schemas-microsoft-com:vml" xmlns:pvml="urn:schemas-microsoft-com:office:powerpoint" xmlns:com="http://schemas.openxmlformats.org/drawingml/2006/compatibility" xmlns:p14="http://schemas.microsoft.com/office/powerpoint/2010/main">
   <p:cSld>
@@ -11188,7 +11958,674 @@
 </p:sld>
 </file>
 
+<file path=ppt/slides/slide6.xml><?xml version="1.0" encoding="utf-8"?>
+<p:sld xmlns:a="http://schemas.openxmlformats.org/drawingml/2006/main" xmlns:r="http://schemas.openxmlformats.org/officeDocument/2006/relationships" xmlns:mc="http://schemas.openxmlformats.org/markup-compatibility/2006" xmlns:mv="urn:schemas-microsoft-com:mac:vml" xmlns:p="http://schemas.openxmlformats.org/presentationml/2006/main" xmlns:c="http://schemas.openxmlformats.org/drawingml/2006/chart" xmlns:dgm="http://schemas.openxmlformats.org/drawingml/2006/diagram" xmlns:o="urn:schemas-microsoft-com:office:office" xmlns:v="urn:schemas-microsoft-com:vml" xmlns:pvml="urn:schemas-microsoft-com:office:powerpoint" xmlns:com="http://schemas.openxmlformats.org/drawingml/2006/compatibility" xmlns:p14="http://schemas.microsoft.com/office/powerpoint/2010/main">
+  <p:cSld>
+    <p:spTree>
+      <p:nvGrpSpPr>
+        <p:cNvPr id="96" name="Shape 96"/>
+        <p:cNvGrpSpPr/>
+        <p:nvPr/>
+      </p:nvGrpSpPr>
+      <p:grpSpPr>
+        <a:xfrm>
+          <a:off x="0" y="0"/>
+          <a:ext cx="0" cy="0"/>
+          <a:chOff x="0" y="0"/>
+          <a:chExt cx="0" cy="0"/>
+        </a:xfrm>
+      </p:grpSpPr>
+      <p:sp>
+        <p:nvSpPr>
+          <p:cNvPr id="97" name="Shape 97"/>
+          <p:cNvSpPr txBox="1"/>
+          <p:nvPr>
+            <p:ph type="title"/>
+          </p:nvPr>
+        </p:nvSpPr>
+        <p:spPr>
+          <a:xfrm>
+            <a:off x="311700" y="445025"/>
+            <a:ext cx="8520600" cy="572700"/>
+          </a:xfrm>
+          <a:prstGeom prst="rect">
+            <a:avLst/>
+          </a:prstGeom>
+        </p:spPr>
+        <p:txBody>
+          <a:bodyPr anchorCtr="0" anchor="t" bIns="91425" lIns="91425" rIns="91425" tIns="91425">
+            <a:noAutofit/>
+          </a:bodyPr>
+          <a:lstStyle/>
+          <a:p>
+            <a:pPr lvl="0">
+              <a:spcBef>
+                <a:spcPts val="0"/>
+              </a:spcBef>
+              <a:buNone/>
+            </a:pPr>
+            <a:r>
+              <a:rPr lang="en"/>
+              <a:t>What is Purely Functional Coding</a:t>
+            </a:r>
+          </a:p>
+        </p:txBody>
+      </p:sp>
+      <p:sp>
+        <p:nvSpPr>
+          <p:cNvPr id="98" name="Shape 98"/>
+          <p:cNvSpPr txBox="1"/>
+          <p:nvPr>
+            <p:ph idx="1" type="body"/>
+          </p:nvPr>
+        </p:nvSpPr>
+        <p:spPr>
+          <a:xfrm>
+            <a:off x="311700" y="1152475"/>
+            <a:ext cx="8520600" cy="3416400"/>
+          </a:xfrm>
+          <a:prstGeom prst="rect">
+            <a:avLst/>
+          </a:prstGeom>
+        </p:spPr>
+        <p:txBody>
+          <a:bodyPr anchorCtr="0" anchor="t" bIns="91425" lIns="91425" rIns="91425" tIns="91425">
+            <a:noAutofit/>
+          </a:bodyPr>
+          <a:lstStyle/>
+          <a:p>
+            <a:pPr lvl="0">
+              <a:spcBef>
+                <a:spcPts val="0"/>
+              </a:spcBef>
+              <a:buNone/>
+            </a:pPr>
+            <a:r>
+              <a:t/>
+            </a:r>
+            <a:endParaRPr/>
+          </a:p>
+        </p:txBody>
+      </p:sp>
+    </p:spTree>
+  </p:cSld>
+  <p:clrMapOvr>
+    <a:masterClrMapping/>
+  </p:clrMapOvr>
+</p:sld>
+</file>
+
+<file path=ppt/slides/slide7.xml><?xml version="1.0" encoding="utf-8"?>
+<p:sld xmlns:a="http://schemas.openxmlformats.org/drawingml/2006/main" xmlns:r="http://schemas.openxmlformats.org/officeDocument/2006/relationships" xmlns:mc="http://schemas.openxmlformats.org/markup-compatibility/2006" xmlns:mv="urn:schemas-microsoft-com:mac:vml" xmlns:p="http://schemas.openxmlformats.org/presentationml/2006/main" xmlns:c="http://schemas.openxmlformats.org/drawingml/2006/chart" xmlns:dgm="http://schemas.openxmlformats.org/drawingml/2006/diagram" xmlns:o="urn:schemas-microsoft-com:office:office" xmlns:v="urn:schemas-microsoft-com:vml" xmlns:pvml="urn:schemas-microsoft-com:office:powerpoint" xmlns:com="http://schemas.openxmlformats.org/drawingml/2006/compatibility" xmlns:p14="http://schemas.microsoft.com/office/powerpoint/2010/main">
+  <p:cSld>
+    <p:spTree>
+      <p:nvGrpSpPr>
+        <p:cNvPr id="102" name="Shape 102"/>
+        <p:cNvGrpSpPr/>
+        <p:nvPr/>
+      </p:nvGrpSpPr>
+      <p:grpSpPr>
+        <a:xfrm>
+          <a:off x="0" y="0"/>
+          <a:ext cx="0" cy="0"/>
+          <a:chOff x="0" y="0"/>
+          <a:chExt cx="0" cy="0"/>
+        </a:xfrm>
+      </p:grpSpPr>
+      <p:sp>
+        <p:nvSpPr>
+          <p:cNvPr id="103" name="Shape 103"/>
+          <p:cNvSpPr txBox="1"/>
+          <p:nvPr>
+            <p:ph type="title"/>
+          </p:nvPr>
+        </p:nvSpPr>
+        <p:spPr>
+          <a:xfrm>
+            <a:off x="311700" y="445025"/>
+            <a:ext cx="8520600" cy="572700"/>
+          </a:xfrm>
+          <a:prstGeom prst="rect">
+            <a:avLst/>
+          </a:prstGeom>
+        </p:spPr>
+        <p:txBody>
+          <a:bodyPr anchorCtr="0" anchor="t" bIns="91425" lIns="91425" rIns="91425" tIns="91425">
+            <a:noAutofit/>
+          </a:bodyPr>
+          <a:lstStyle/>
+          <a:p>
+            <a:pPr lvl="0">
+              <a:spcBef>
+                <a:spcPts val="0"/>
+              </a:spcBef>
+              <a:buNone/>
+            </a:pPr>
+            <a:r>
+              <a:rPr lang="en"/>
+              <a:t>Functors</a:t>
+            </a:r>
+          </a:p>
+        </p:txBody>
+      </p:sp>
+      <p:sp>
+        <p:nvSpPr>
+          <p:cNvPr id="104" name="Shape 104"/>
+          <p:cNvSpPr txBox="1"/>
+          <p:nvPr>
+            <p:ph idx="1" type="body"/>
+          </p:nvPr>
+        </p:nvSpPr>
+        <p:spPr>
+          <a:xfrm>
+            <a:off x="311700" y="1152475"/>
+            <a:ext cx="8520600" cy="3416400"/>
+          </a:xfrm>
+          <a:prstGeom prst="rect">
+            <a:avLst/>
+          </a:prstGeom>
+        </p:spPr>
+        <p:txBody>
+          <a:bodyPr anchorCtr="0" anchor="t" bIns="91425" lIns="91425" rIns="91425" tIns="91425">
+            <a:noAutofit/>
+          </a:bodyPr>
+          <a:lstStyle/>
+          <a:p>
+            <a:pPr lvl="0">
+              <a:spcBef>
+                <a:spcPts val="0"/>
+              </a:spcBef>
+              <a:buNone/>
+            </a:pPr>
+            <a:r>
+              <a:t/>
+            </a:r>
+            <a:endParaRPr/>
+          </a:p>
+        </p:txBody>
+      </p:sp>
+    </p:spTree>
+  </p:cSld>
+  <p:clrMapOvr>
+    <a:masterClrMapping/>
+  </p:clrMapOvr>
+</p:sld>
+</file>
+
+<file path=ppt/slides/slide8.xml><?xml version="1.0" encoding="utf-8"?>
+<p:sld xmlns:a="http://schemas.openxmlformats.org/drawingml/2006/main" xmlns:r="http://schemas.openxmlformats.org/officeDocument/2006/relationships" xmlns:mc="http://schemas.openxmlformats.org/markup-compatibility/2006" xmlns:mv="urn:schemas-microsoft-com:mac:vml" xmlns:p="http://schemas.openxmlformats.org/presentationml/2006/main" xmlns:c="http://schemas.openxmlformats.org/drawingml/2006/chart" xmlns:dgm="http://schemas.openxmlformats.org/drawingml/2006/diagram" xmlns:o="urn:schemas-microsoft-com:office:office" xmlns:v="urn:schemas-microsoft-com:vml" xmlns:pvml="urn:schemas-microsoft-com:office:powerpoint" xmlns:com="http://schemas.openxmlformats.org/drawingml/2006/compatibility" xmlns:p14="http://schemas.microsoft.com/office/powerpoint/2010/main">
+  <p:cSld>
+    <p:spTree>
+      <p:nvGrpSpPr>
+        <p:cNvPr id="108" name="Shape 108"/>
+        <p:cNvGrpSpPr/>
+        <p:nvPr/>
+      </p:nvGrpSpPr>
+      <p:grpSpPr>
+        <a:xfrm>
+          <a:off x="0" y="0"/>
+          <a:ext cx="0" cy="0"/>
+          <a:chOff x="0" y="0"/>
+          <a:chExt cx="0" cy="0"/>
+        </a:xfrm>
+      </p:grpSpPr>
+      <p:sp>
+        <p:nvSpPr>
+          <p:cNvPr id="109" name="Shape 109"/>
+          <p:cNvSpPr txBox="1"/>
+          <p:nvPr>
+            <p:ph type="title"/>
+          </p:nvPr>
+        </p:nvSpPr>
+        <p:spPr>
+          <a:xfrm>
+            <a:off x="311700" y="445025"/>
+            <a:ext cx="8520600" cy="572700"/>
+          </a:xfrm>
+          <a:prstGeom prst="rect">
+            <a:avLst/>
+          </a:prstGeom>
+        </p:spPr>
+        <p:txBody>
+          <a:bodyPr anchorCtr="0" anchor="t" bIns="91425" lIns="91425" rIns="91425" tIns="91425">
+            <a:noAutofit/>
+          </a:bodyPr>
+          <a:lstStyle/>
+          <a:p>
+            <a:pPr lvl="0">
+              <a:spcBef>
+                <a:spcPts val="0"/>
+              </a:spcBef>
+              <a:buNone/>
+            </a:pPr>
+            <a:r>
+              <a:rPr lang="en"/>
+              <a:t>Applicative Functors</a:t>
+            </a:r>
+          </a:p>
+        </p:txBody>
+      </p:sp>
+      <p:sp>
+        <p:nvSpPr>
+          <p:cNvPr id="110" name="Shape 110"/>
+          <p:cNvSpPr txBox="1"/>
+          <p:nvPr>
+            <p:ph idx="1" type="body"/>
+          </p:nvPr>
+        </p:nvSpPr>
+        <p:spPr>
+          <a:xfrm>
+            <a:off x="311700" y="1152475"/>
+            <a:ext cx="8520600" cy="3416400"/>
+          </a:xfrm>
+          <a:prstGeom prst="rect">
+            <a:avLst/>
+          </a:prstGeom>
+        </p:spPr>
+        <p:txBody>
+          <a:bodyPr anchorCtr="0" anchor="t" bIns="91425" lIns="91425" rIns="91425" tIns="91425">
+            <a:noAutofit/>
+          </a:bodyPr>
+          <a:lstStyle/>
+          <a:p>
+            <a:pPr lvl="0">
+              <a:spcBef>
+                <a:spcPts val="0"/>
+              </a:spcBef>
+              <a:buNone/>
+            </a:pPr>
+            <a:r>
+              <a:t/>
+            </a:r>
+            <a:endParaRPr/>
+          </a:p>
+        </p:txBody>
+      </p:sp>
+    </p:spTree>
+  </p:cSld>
+  <p:clrMapOvr>
+    <a:masterClrMapping/>
+  </p:clrMapOvr>
+</p:sld>
+</file>
+
+<file path=ppt/slides/slide9.xml><?xml version="1.0" encoding="utf-8"?>
+<p:sld xmlns:a="http://schemas.openxmlformats.org/drawingml/2006/main" xmlns:r="http://schemas.openxmlformats.org/officeDocument/2006/relationships" xmlns:mc="http://schemas.openxmlformats.org/markup-compatibility/2006" xmlns:mv="urn:schemas-microsoft-com:mac:vml" xmlns:p="http://schemas.openxmlformats.org/presentationml/2006/main" xmlns:c="http://schemas.openxmlformats.org/drawingml/2006/chart" xmlns:dgm="http://schemas.openxmlformats.org/drawingml/2006/diagram" xmlns:o="urn:schemas-microsoft-com:office:office" xmlns:v="urn:schemas-microsoft-com:vml" xmlns:pvml="urn:schemas-microsoft-com:office:powerpoint" xmlns:com="http://schemas.openxmlformats.org/drawingml/2006/compatibility" xmlns:p14="http://schemas.microsoft.com/office/powerpoint/2010/main">
+  <p:cSld>
+    <p:spTree>
+      <p:nvGrpSpPr>
+        <p:cNvPr id="114" name="Shape 114"/>
+        <p:cNvGrpSpPr/>
+        <p:nvPr/>
+      </p:nvGrpSpPr>
+      <p:grpSpPr>
+        <a:xfrm>
+          <a:off x="0" y="0"/>
+          <a:ext cx="0" cy="0"/>
+          <a:chOff x="0" y="0"/>
+          <a:chExt cx="0" cy="0"/>
+        </a:xfrm>
+      </p:grpSpPr>
+      <p:sp>
+        <p:nvSpPr>
+          <p:cNvPr id="115" name="Shape 115"/>
+          <p:cNvSpPr txBox="1"/>
+          <p:nvPr>
+            <p:ph type="title"/>
+          </p:nvPr>
+        </p:nvSpPr>
+        <p:spPr>
+          <a:xfrm>
+            <a:off x="311700" y="445025"/>
+            <a:ext cx="8520600" cy="572700"/>
+          </a:xfrm>
+          <a:prstGeom prst="rect">
+            <a:avLst/>
+          </a:prstGeom>
+        </p:spPr>
+        <p:txBody>
+          <a:bodyPr anchorCtr="0" anchor="t" bIns="91425" lIns="91425" rIns="91425" tIns="91425">
+            <a:noAutofit/>
+          </a:bodyPr>
+          <a:lstStyle/>
+          <a:p>
+            <a:pPr lvl="0">
+              <a:spcBef>
+                <a:spcPts val="0"/>
+              </a:spcBef>
+              <a:buNone/>
+            </a:pPr>
+            <a:r>
+              <a:rPr lang="en"/>
+              <a:t>Monoid</a:t>
+            </a:r>
+          </a:p>
+        </p:txBody>
+      </p:sp>
+      <p:sp>
+        <p:nvSpPr>
+          <p:cNvPr id="116" name="Shape 116"/>
+          <p:cNvSpPr txBox="1"/>
+          <p:nvPr>
+            <p:ph idx="1" type="body"/>
+          </p:nvPr>
+        </p:nvSpPr>
+        <p:spPr>
+          <a:xfrm>
+            <a:off x="311700" y="1152475"/>
+            <a:ext cx="8520600" cy="3416400"/>
+          </a:xfrm>
+          <a:prstGeom prst="rect">
+            <a:avLst/>
+          </a:prstGeom>
+        </p:spPr>
+        <p:txBody>
+          <a:bodyPr anchorCtr="0" anchor="t" bIns="91425" lIns="91425" rIns="91425" tIns="91425">
+            <a:noAutofit/>
+          </a:bodyPr>
+          <a:lstStyle/>
+          <a:p>
+            <a:pPr lvl="0">
+              <a:spcBef>
+                <a:spcPts val="0"/>
+              </a:spcBef>
+              <a:buNone/>
+            </a:pPr>
+            <a:r>
+              <a:t/>
+            </a:r>
+            <a:endParaRPr/>
+          </a:p>
+        </p:txBody>
+      </p:sp>
+    </p:spTree>
+  </p:cSld>
+  <p:clrMapOvr>
+    <a:masterClrMapping/>
+  </p:clrMapOvr>
+</p:sld>
+</file>
+
 <file path=ppt/theme/theme1.xml><?xml version="1.0" encoding="utf-8"?>
+<a:theme xmlns:a="http://schemas.openxmlformats.org/drawingml/2006/main" xmlns:r="http://schemas.openxmlformats.org/officeDocument/2006/relationships" name="Custom Theme">
+  <a:themeElements>
+    <a:clrScheme name="Default">
+      <a:dk1>
+        <a:srgbClr val="000000"/>
+      </a:dk1>
+      <a:lt1>
+        <a:srgbClr val="FFFFFF"/>
+      </a:lt1>
+      <a:dk2>
+        <a:srgbClr val="158158"/>
+      </a:dk2>
+      <a:lt2>
+        <a:srgbClr val="F3F3F3"/>
+      </a:lt2>
+      <a:accent1>
+        <a:srgbClr val="058DC7"/>
+      </a:accent1>
+      <a:accent2>
+        <a:srgbClr val="50B432"/>
+      </a:accent2>
+      <a:accent3>
+        <a:srgbClr val="ED561B"/>
+      </a:accent3>
+      <a:accent4>
+        <a:srgbClr val="EDEF00"/>
+      </a:accent4>
+      <a:accent5>
+        <a:srgbClr val="24CBE5"/>
+      </a:accent5>
+      <a:accent6>
+        <a:srgbClr val="64E572"/>
+      </a:accent6>
+      <a:hlink>
+        <a:srgbClr val="2200CC"/>
+      </a:hlink>
+      <a:folHlink>
+        <a:srgbClr val="551A8B"/>
+      </a:folHlink>
+    </a:clrScheme>
+    <a:fontScheme name="Office">
+      <a:majorFont>
+        <a:latin typeface="Arial"/>
+        <a:ea typeface=""/>
+        <a:cs typeface=""/>
+        <a:font script="Jpan" typeface="ＭＳ Ｐゴシック"/>
+        <a:font script="Hang" typeface="맑은 고딕"/>
+        <a:font script="Hans" typeface="宋体"/>
+        <a:font script="Hant" typeface="新細明體"/>
+        <a:font script="Arab" typeface="Times New Roman"/>
+        <a:font script="Hebr" typeface="Times New Roman"/>
+        <a:font script="Thai" typeface="Angsana New"/>
+        <a:font script="Ethi" typeface="Nyala"/>
+        <a:font script="Beng" typeface="Vrinda"/>
+        <a:font script="Gujr" typeface="Shruti"/>
+        <a:font script="Khmr" typeface="MoolBoran"/>
+        <a:font script="Knda" typeface="Tunga"/>
+        <a:font script="Guru" typeface="Raavi"/>
+        <a:font script="Cans" typeface="Euphemia"/>
+        <a:font script="Cher" typeface="Plantagenet Cherokee"/>
+        <a:font script="Yiii" typeface="Microsoft Yi Baiti"/>
+        <a:font script="Tibt" typeface="Microsoft Himalaya"/>
+        <a:font script="Thaa" typeface="MV Boli"/>
+        <a:font script="Deva" typeface="Mangal"/>
+        <a:font script="Telu" typeface="Gautami"/>
+        <a:font script="Taml" typeface="Latha"/>
+        <a:font script="Syrc" typeface="Estrangelo Edessa"/>
+        <a:font script="Orya" typeface="Kalinga"/>
+        <a:font script="Mlym" typeface="Kartika"/>
+        <a:font script="Laoo" typeface="DokChampa"/>
+        <a:font script="Sinh" typeface="Iskoola Pota"/>
+        <a:font script="Mong" typeface="Mongolian Baiti"/>
+        <a:font script="Viet" typeface="Times New Roman"/>
+        <a:font script="Uigh" typeface="Microsoft Uighur"/>
+        <a:font script="Geor" typeface="Sylfaen"/>
+      </a:majorFont>
+      <a:minorFont>
+        <a:latin typeface="Arial"/>
+        <a:ea typeface=""/>
+        <a:cs typeface=""/>
+        <a:font script="Jpan" typeface="ＭＳ Ｐゴシック"/>
+        <a:font script="Hang" typeface="맑은 고딕"/>
+        <a:font script="Hans" typeface="宋体"/>
+        <a:font script="Hant" typeface="新細明體"/>
+        <a:font script="Arab" typeface="Arial"/>
+        <a:font script="Hebr" typeface="Arial"/>
+        <a:font script="Thai" typeface="Cordia New"/>
+        <a:font script="Ethi" typeface="Nyala"/>
+        <a:font script="Beng" typeface="Vrinda"/>
+        <a:font script="Gujr" typeface="Shruti"/>
+        <a:font script="Khmr" typeface="DaunPenh"/>
+        <a:font script="Knda" typeface="Tunga"/>
+        <a:font script="Guru" typeface="Raavi"/>
+        <a:font script="Cans" typeface="Euphemia"/>
+        <a:font script="Cher" typeface="Plantagenet Cherokee"/>
+        <a:font script="Yiii" typeface="Microsoft Yi Baiti"/>
+        <a:font script="Tibt" typeface="Microsoft Himalaya"/>
+        <a:font script="Thaa" typeface="MV Boli"/>
+        <a:font script="Deva" typeface="Mangal"/>
+        <a:font script="Telu" typeface="Gautami"/>
+        <a:font script="Taml" typeface="Latha"/>
+        <a:font script="Syrc" typeface="Estrangelo Edessa"/>
+        <a:font script="Orya" typeface="Kalinga"/>
+        <a:font script="Mlym" typeface="Kartika"/>
+        <a:font script="Laoo" typeface="DokChampa"/>
+        <a:font script="Sinh" typeface="Iskoola Pota"/>
+        <a:font script="Mong" typeface="Mongolian Baiti"/>
+        <a:font script="Viet" typeface="Arial"/>
+        <a:font script="Uigh" typeface="Microsoft Uighur"/>
+        <a:font script="Geor" typeface="Sylfaen"/>
+      </a:minorFont>
+    </a:fontScheme>
+    <a:fmtScheme name="Office">
+      <a:fillStyleLst>
+        <a:solidFill>
+          <a:schemeClr val="phClr"/>
+        </a:solidFill>
+        <a:gradFill rotWithShape="1">
+          <a:gsLst>
+            <a:gs pos="0">
+              <a:schemeClr val="phClr">
+                <a:tint val="50000"/>
+                <a:satMod val="300000"/>
+              </a:schemeClr>
+            </a:gs>
+            <a:gs pos="35000">
+              <a:schemeClr val="phClr">
+                <a:tint val="37000"/>
+                <a:satMod val="300000"/>
+              </a:schemeClr>
+            </a:gs>
+            <a:gs pos="100000">
+              <a:schemeClr val="phClr">
+                <a:tint val="15000"/>
+                <a:satMod val="350000"/>
+              </a:schemeClr>
+            </a:gs>
+          </a:gsLst>
+          <a:lin ang="16200000" scaled="1"/>
+        </a:gradFill>
+        <a:gradFill rotWithShape="1">
+          <a:gsLst>
+            <a:gs pos="0">
+              <a:schemeClr val="phClr">
+                <a:tint val="100000"/>
+                <a:shade val="100000"/>
+                <a:satMod val="130000"/>
+              </a:schemeClr>
+            </a:gs>
+            <a:gs pos="100000">
+              <a:schemeClr val="phClr">
+                <a:tint val="50000"/>
+                <a:shade val="100000"/>
+                <a:satMod val="350000"/>
+              </a:schemeClr>
+            </a:gs>
+          </a:gsLst>
+          <a:lin ang="16200000" scaled="0"/>
+        </a:gradFill>
+      </a:fillStyleLst>
+      <a:lnStyleLst>
+        <a:ln w="9525" cap="flat" cmpd="sng" algn="ctr">
+          <a:solidFill>
+            <a:schemeClr val="phClr">
+              <a:shade val="95000"/>
+              <a:satMod val="105000"/>
+            </a:schemeClr>
+          </a:solidFill>
+          <a:prstDash val="solid"/>
+        </a:ln>
+        <a:ln w="25400" cap="flat" cmpd="sng" algn="ctr">
+          <a:solidFill>
+            <a:schemeClr val="phClr"/>
+          </a:solidFill>
+          <a:prstDash val="solid"/>
+        </a:ln>
+        <a:ln w="38100" cap="flat" cmpd="sng" algn="ctr">
+          <a:solidFill>
+            <a:schemeClr val="phClr"/>
+          </a:solidFill>
+          <a:prstDash val="solid"/>
+        </a:ln>
+      </a:lnStyleLst>
+      <a:effectStyleLst>
+        <a:effectStyle>
+          <a:effectLst>
+            <a:outerShdw blurRad="40000" dist="20000" dir="5400000" rotWithShape="0">
+              <a:srgbClr val="000000">
+                <a:alpha val="38000"/>
+              </a:srgbClr>
+            </a:outerShdw>
+          </a:effectLst>
+        </a:effectStyle>
+        <a:effectStyle>
+          <a:effectLst>
+            <a:outerShdw blurRad="40000" dist="23000" dir="5400000" rotWithShape="0">
+              <a:srgbClr val="000000">
+                <a:alpha val="35000"/>
+              </a:srgbClr>
+            </a:outerShdw>
+          </a:effectLst>
+        </a:effectStyle>
+        <a:effectStyle>
+          <a:effectLst>
+            <a:outerShdw blurRad="40000" dist="23000" dir="5400000" rotWithShape="0">
+              <a:srgbClr val="000000">
+                <a:alpha val="35000"/>
+              </a:srgbClr>
+            </a:outerShdw>
+          </a:effectLst>
+          <a:scene3d>
+            <a:camera prst="orthographicFront">
+              <a:rot lat="0" lon="0" rev="0"/>
+            </a:camera>
+            <a:lightRig rig="threePt" dir="t">
+              <a:rot lat="0" lon="0" rev="1200000"/>
+            </a:lightRig>
+          </a:scene3d>
+          <a:sp3d>
+            <a:bevelT w="63500" h="25400"/>
+          </a:sp3d>
+        </a:effectStyle>
+      </a:effectStyleLst>
+      <a:bgFillStyleLst>
+        <a:solidFill>
+          <a:schemeClr val="phClr"/>
+        </a:solidFill>
+        <a:gradFill rotWithShape="1">
+          <a:gsLst>
+            <a:gs pos="0">
+              <a:schemeClr val="phClr">
+                <a:tint val="40000"/>
+                <a:satMod val="350000"/>
+              </a:schemeClr>
+            </a:gs>
+            <a:gs pos="40000">
+              <a:schemeClr val="phClr">
+                <a:tint val="45000"/>
+                <a:shade val="99000"/>
+                <a:satMod val="350000"/>
+              </a:schemeClr>
+            </a:gs>
+            <a:gs pos="100000">
+              <a:schemeClr val="phClr">
+                <a:shade val="20000"/>
+                <a:satMod val="255000"/>
+              </a:schemeClr>
+            </a:gs>
+          </a:gsLst>
+          <a:path path="circle">
+            <a:fillToRect l="50000" t="-80000" r="50000" b="180000"/>
+          </a:path>
+        </a:gradFill>
+        <a:gradFill rotWithShape="1">
+          <a:gsLst>
+            <a:gs pos="0">
+              <a:schemeClr val="phClr">
+                <a:tint val="80000"/>
+                <a:satMod val="300000"/>
+              </a:schemeClr>
+            </a:gs>
+            <a:gs pos="100000">
+              <a:schemeClr val="phClr">
+                <a:shade val="30000"/>
+                <a:satMod val="200000"/>
+              </a:schemeClr>
+            </a:gs>
+          </a:gsLst>
+          <a:path path="circle">
+            <a:fillToRect l="50000" t="50000" r="50000" b="50000"/>
+          </a:path>
+        </a:gradFill>
+      </a:bgFillStyleLst>
+    </a:fmtScheme>
+  </a:themeElements>
+</a:theme>
+</file>
+
+<file path=ppt/theme/theme2.xml><?xml version="1.0" encoding="utf-8"?>
 <a:theme xmlns:a="http://schemas.openxmlformats.org/drawingml/2006/main" xmlns:r="http://schemas.openxmlformats.org/officeDocument/2006/relationships" name="spearmint">
   <a:themeElements>
     <a:clrScheme name="Spearmint">
@@ -11465,283 +12902,4 @@
     </a:fmtScheme>
   </a:themeElements>
 </a:theme>
-</file>
-
-<file path=ppt/theme/theme2.xml><?xml version="1.0" encoding="utf-8"?>
-<a:theme xmlns:a="http://schemas.openxmlformats.org/drawingml/2006/main" xmlns:r="http://schemas.openxmlformats.org/officeDocument/2006/relationships" name="Custom Theme">
-  <a:themeElements>
-    <a:clrScheme name="Default">
-      <a:dk1>
-        <a:srgbClr val="000000"/>
-      </a:dk1>
-      <a:lt1>
-        <a:srgbClr val="FFFFFF"/>
-      </a:lt1>
-      <a:dk2>
-        <a:srgbClr val="158158"/>
-      </a:dk2>
-      <a:lt2>
-        <a:srgbClr val="F3F3F3"/>
-      </a:lt2>
-      <a:accent1>
-        <a:srgbClr val="058DC7"/>
-      </a:accent1>
-      <a:accent2>
-        <a:srgbClr val="50B432"/>
-      </a:accent2>
-      <a:accent3>
-        <a:srgbClr val="ED561B"/>
-      </a:accent3>
-      <a:accent4>
-        <a:srgbClr val="EDEF00"/>
-      </a:accent4>
-      <a:accent5>
-        <a:srgbClr val="24CBE5"/>
-      </a:accent5>
-      <a:accent6>
-        <a:srgbClr val="64E572"/>
-      </a:accent6>
-      <a:hlink>
-        <a:srgbClr val="2200CC"/>
-      </a:hlink>
-      <a:folHlink>
-        <a:srgbClr val="551A8B"/>
-      </a:folHlink>
-    </a:clrScheme>
-    <a:fontScheme name="Office">
-      <a:majorFont>
-        <a:latin typeface="Arial"/>
-        <a:ea typeface=""/>
-        <a:cs typeface=""/>
-        <a:font script="Jpan" typeface="ＭＳ Ｐゴシック"/>
-        <a:font script="Hang" typeface="맑은 고딕"/>
-        <a:font script="Hans" typeface="宋体"/>
-        <a:font script="Hant" typeface="新細明體"/>
-        <a:font script="Arab" typeface="Times New Roman"/>
-        <a:font script="Hebr" typeface="Times New Roman"/>
-        <a:font script="Thai" typeface="Angsana New"/>
-        <a:font script="Ethi" typeface="Nyala"/>
-        <a:font script="Beng" typeface="Vrinda"/>
-        <a:font script="Gujr" typeface="Shruti"/>
-        <a:font script="Khmr" typeface="MoolBoran"/>
-        <a:font script="Knda" typeface="Tunga"/>
-        <a:font script="Guru" typeface="Raavi"/>
-        <a:font script="Cans" typeface="Euphemia"/>
-        <a:font script="Cher" typeface="Plantagenet Cherokee"/>
-        <a:font script="Yiii" typeface="Microsoft Yi Baiti"/>
-        <a:font script="Tibt" typeface="Microsoft Himalaya"/>
-        <a:font script="Thaa" typeface="MV Boli"/>
-        <a:font script="Deva" typeface="Mangal"/>
-        <a:font script="Telu" typeface="Gautami"/>
-        <a:font script="Taml" typeface="Latha"/>
-        <a:font script="Syrc" typeface="Estrangelo Edessa"/>
-        <a:font script="Orya" typeface="Kalinga"/>
-        <a:font script="Mlym" typeface="Kartika"/>
-        <a:font script="Laoo" typeface="DokChampa"/>
-        <a:font script="Sinh" typeface="Iskoola Pota"/>
-        <a:font script="Mong" typeface="Mongolian Baiti"/>
-        <a:font script="Viet" typeface="Times New Roman"/>
-        <a:font script="Uigh" typeface="Microsoft Uighur"/>
-        <a:font script="Geor" typeface="Sylfaen"/>
-      </a:majorFont>
-      <a:minorFont>
-        <a:latin typeface="Arial"/>
-        <a:ea typeface=""/>
-        <a:cs typeface=""/>
-        <a:font script="Jpan" typeface="ＭＳ Ｐゴシック"/>
-        <a:font script="Hang" typeface="맑은 고딕"/>
-        <a:font script="Hans" typeface="宋体"/>
-        <a:font script="Hant" typeface="新細明體"/>
-        <a:font script="Arab" typeface="Arial"/>
-        <a:font script="Hebr" typeface="Arial"/>
-        <a:font script="Thai" typeface="Cordia New"/>
-        <a:font script="Ethi" typeface="Nyala"/>
-        <a:font script="Beng" typeface="Vrinda"/>
-        <a:font script="Gujr" typeface="Shruti"/>
-        <a:font script="Khmr" typeface="DaunPenh"/>
-        <a:font script="Knda" typeface="Tunga"/>
-        <a:font script="Guru" typeface="Raavi"/>
-        <a:font script="Cans" typeface="Euphemia"/>
-        <a:font script="Cher" typeface="Plantagenet Cherokee"/>
-        <a:font script="Yiii" typeface="Microsoft Yi Baiti"/>
-        <a:font script="Tibt" typeface="Microsoft Himalaya"/>
-        <a:font script="Thaa" typeface="MV Boli"/>
-        <a:font script="Deva" typeface="Mangal"/>
-        <a:font script="Telu" typeface="Gautami"/>
-        <a:font script="Taml" typeface="Latha"/>
-        <a:font script="Syrc" typeface="Estrangelo Edessa"/>
-        <a:font script="Orya" typeface="Kalinga"/>
-        <a:font script="Mlym" typeface="Kartika"/>
-        <a:font script="Laoo" typeface="DokChampa"/>
-        <a:font script="Sinh" typeface="Iskoola Pota"/>
-        <a:font script="Mong" typeface="Mongolian Baiti"/>
-        <a:font script="Viet" typeface="Arial"/>
-        <a:font script="Uigh" typeface="Microsoft Uighur"/>
-        <a:font script="Geor" typeface="Sylfaen"/>
-      </a:minorFont>
-    </a:fontScheme>
-    <a:fmtScheme name="Office">
-      <a:fillStyleLst>
-        <a:solidFill>
-          <a:schemeClr val="phClr"/>
-        </a:solidFill>
-        <a:gradFill rotWithShape="1">
-          <a:gsLst>
-            <a:gs pos="0">
-              <a:schemeClr val="phClr">
-                <a:tint val="50000"/>
-                <a:satMod val="300000"/>
-              </a:schemeClr>
-            </a:gs>
-            <a:gs pos="35000">
-              <a:schemeClr val="phClr">
-                <a:tint val="37000"/>
-                <a:satMod val="300000"/>
-              </a:schemeClr>
-            </a:gs>
-            <a:gs pos="100000">
-              <a:schemeClr val="phClr">
-                <a:tint val="15000"/>
-                <a:satMod val="350000"/>
-              </a:schemeClr>
-            </a:gs>
-          </a:gsLst>
-          <a:lin ang="16200000" scaled="1"/>
-        </a:gradFill>
-        <a:gradFill rotWithShape="1">
-          <a:gsLst>
-            <a:gs pos="0">
-              <a:schemeClr val="phClr">
-                <a:tint val="100000"/>
-                <a:shade val="100000"/>
-                <a:satMod val="130000"/>
-              </a:schemeClr>
-            </a:gs>
-            <a:gs pos="100000">
-              <a:schemeClr val="phClr">
-                <a:tint val="50000"/>
-                <a:shade val="100000"/>
-                <a:satMod val="350000"/>
-              </a:schemeClr>
-            </a:gs>
-          </a:gsLst>
-          <a:lin ang="16200000" scaled="0"/>
-        </a:gradFill>
-      </a:fillStyleLst>
-      <a:lnStyleLst>
-        <a:ln w="9525" cap="flat" cmpd="sng" algn="ctr">
-          <a:solidFill>
-            <a:schemeClr val="phClr">
-              <a:shade val="95000"/>
-              <a:satMod val="105000"/>
-            </a:schemeClr>
-          </a:solidFill>
-          <a:prstDash val="solid"/>
-        </a:ln>
-        <a:ln w="25400" cap="flat" cmpd="sng" algn="ctr">
-          <a:solidFill>
-            <a:schemeClr val="phClr"/>
-          </a:solidFill>
-          <a:prstDash val="solid"/>
-        </a:ln>
-        <a:ln w="38100" cap="flat" cmpd="sng" algn="ctr">
-          <a:solidFill>
-            <a:schemeClr val="phClr"/>
-          </a:solidFill>
-          <a:prstDash val="solid"/>
-        </a:ln>
-      </a:lnStyleLst>
-      <a:effectStyleLst>
-        <a:effectStyle>
-          <a:effectLst>
-            <a:outerShdw blurRad="40000" dist="20000" dir="5400000" rotWithShape="0">
-              <a:srgbClr val="000000">
-                <a:alpha val="38000"/>
-              </a:srgbClr>
-            </a:outerShdw>
-          </a:effectLst>
-        </a:effectStyle>
-        <a:effectStyle>
-          <a:effectLst>
-            <a:outerShdw blurRad="40000" dist="23000" dir="5400000" rotWithShape="0">
-              <a:srgbClr val="000000">
-                <a:alpha val="35000"/>
-              </a:srgbClr>
-            </a:outerShdw>
-          </a:effectLst>
-        </a:effectStyle>
-        <a:effectStyle>
-          <a:effectLst>
-            <a:outerShdw blurRad="40000" dist="23000" dir="5400000" rotWithShape="0">
-              <a:srgbClr val="000000">
-                <a:alpha val="35000"/>
-              </a:srgbClr>
-            </a:outerShdw>
-          </a:effectLst>
-          <a:scene3d>
-            <a:camera prst="orthographicFront">
-              <a:rot lat="0" lon="0" rev="0"/>
-            </a:camera>
-            <a:lightRig rig="threePt" dir="t">
-              <a:rot lat="0" lon="0" rev="1200000"/>
-            </a:lightRig>
-          </a:scene3d>
-          <a:sp3d>
-            <a:bevelT w="63500" h="25400"/>
-          </a:sp3d>
-        </a:effectStyle>
-      </a:effectStyleLst>
-      <a:bgFillStyleLst>
-        <a:solidFill>
-          <a:schemeClr val="phClr"/>
-        </a:solidFill>
-        <a:gradFill rotWithShape="1">
-          <a:gsLst>
-            <a:gs pos="0">
-              <a:schemeClr val="phClr">
-                <a:tint val="40000"/>
-                <a:satMod val="350000"/>
-              </a:schemeClr>
-            </a:gs>
-            <a:gs pos="40000">
-              <a:schemeClr val="phClr">
-                <a:tint val="45000"/>
-                <a:shade val="99000"/>
-                <a:satMod val="350000"/>
-              </a:schemeClr>
-            </a:gs>
-            <a:gs pos="100000">
-              <a:schemeClr val="phClr">
-                <a:shade val="20000"/>
-                <a:satMod val="255000"/>
-              </a:schemeClr>
-            </a:gs>
-          </a:gsLst>
-          <a:path path="circle">
-            <a:fillToRect l="50000" t="-80000" r="50000" b="180000"/>
-          </a:path>
-        </a:gradFill>
-        <a:gradFill rotWithShape="1">
-          <a:gsLst>
-            <a:gs pos="0">
-              <a:schemeClr val="phClr">
-                <a:tint val="80000"/>
-                <a:satMod val="300000"/>
-              </a:schemeClr>
-            </a:gs>
-            <a:gs pos="100000">
-              <a:schemeClr val="phClr">
-                <a:shade val="30000"/>
-                <a:satMod val="200000"/>
-              </a:schemeClr>
-            </a:gs>
-          </a:gsLst>
-          <a:path path="circle">
-            <a:fillToRect l="50000" t="50000" r="50000" b="50000"/>
-          </a:path>
-        </a:gradFill>
-      </a:bgFillStyleLst>
-    </a:fmtScheme>
-  </a:themeElements>
-</a:theme>
 </file>
</xml_diff>